<commit_message>
added one more topic for exploration
AddTapi.NET (http://www.traysoft.com/add-tapi-telephony-library)
</commit_message>
<xml_diff>
--- a/Problem1-Calling phones through Web App.pptx
+++ b/Problem1-Calling phones through Web App.pptx
@@ -104,6 +104,11 @@
       </a:defRPr>
     </a:lvl9pPr>
   </p:defaultTextStyle>
+  <p:extLst>
+    <p:ext uri="{EFAFB233-063F-42B5-8137-9DF3F51BA10A}">
+      <p15:sldGuideLst xmlns:p15="http://schemas.microsoft.com/office/powerpoint/2012/main"/>
+    </p:ext>
+  </p:extLst>
 </p:presentation>
 </file>
 
@@ -238,7 +243,7 @@
           <a:p>
             <a:fld id="{463E2EB7-25CF-43DD-B062-4895702B6E7A}" type="datetimeFigureOut">
               <a:rPr lang="en-US" smtClean="0"/>
-              <a:t>12/29/2016</a:t>
+              <a:t>12/30/2016</a:t>
             </a:fld>
             <a:endParaRPr lang="en-US"/>
           </a:p>
@@ -408,7 +413,7 @@
           <a:p>
             <a:fld id="{463E2EB7-25CF-43DD-B062-4895702B6E7A}" type="datetimeFigureOut">
               <a:rPr lang="en-US" smtClean="0"/>
-              <a:t>12/29/2016</a:t>
+              <a:t>12/30/2016</a:t>
             </a:fld>
             <a:endParaRPr lang="en-US"/>
           </a:p>
@@ -588,7 +593,7 @@
           <a:p>
             <a:fld id="{463E2EB7-25CF-43DD-B062-4895702B6E7A}" type="datetimeFigureOut">
               <a:rPr lang="en-US" smtClean="0"/>
-              <a:t>12/29/2016</a:t>
+              <a:t>12/30/2016</a:t>
             </a:fld>
             <a:endParaRPr lang="en-US"/>
           </a:p>
@@ -758,7 +763,7 @@
           <a:p>
             <a:fld id="{463E2EB7-25CF-43DD-B062-4895702B6E7A}" type="datetimeFigureOut">
               <a:rPr lang="en-US" smtClean="0"/>
-              <a:t>12/29/2016</a:t>
+              <a:t>12/30/2016</a:t>
             </a:fld>
             <a:endParaRPr lang="en-US"/>
           </a:p>
@@ -1004,7 +1009,7 @@
           <a:p>
             <a:fld id="{463E2EB7-25CF-43DD-B062-4895702B6E7A}" type="datetimeFigureOut">
               <a:rPr lang="en-US" smtClean="0"/>
-              <a:t>12/29/2016</a:t>
+              <a:t>12/30/2016</a:t>
             </a:fld>
             <a:endParaRPr lang="en-US"/>
           </a:p>
@@ -1236,7 +1241,7 @@
           <a:p>
             <a:fld id="{463E2EB7-25CF-43DD-B062-4895702B6E7A}" type="datetimeFigureOut">
               <a:rPr lang="en-US" smtClean="0"/>
-              <a:t>12/29/2016</a:t>
+              <a:t>12/30/2016</a:t>
             </a:fld>
             <a:endParaRPr lang="en-US"/>
           </a:p>
@@ -1603,7 +1608,7 @@
           <a:p>
             <a:fld id="{463E2EB7-25CF-43DD-B062-4895702B6E7A}" type="datetimeFigureOut">
               <a:rPr lang="en-US" smtClean="0"/>
-              <a:t>12/29/2016</a:t>
+              <a:t>12/30/2016</a:t>
             </a:fld>
             <a:endParaRPr lang="en-US"/>
           </a:p>
@@ -1721,7 +1726,7 @@
           <a:p>
             <a:fld id="{463E2EB7-25CF-43DD-B062-4895702B6E7A}" type="datetimeFigureOut">
               <a:rPr lang="en-US" smtClean="0"/>
-              <a:t>12/29/2016</a:t>
+              <a:t>12/30/2016</a:t>
             </a:fld>
             <a:endParaRPr lang="en-US"/>
           </a:p>
@@ -1816,7 +1821,7 @@
           <a:p>
             <a:fld id="{463E2EB7-25CF-43DD-B062-4895702B6E7A}" type="datetimeFigureOut">
               <a:rPr lang="en-US" smtClean="0"/>
-              <a:t>12/29/2016</a:t>
+              <a:t>12/30/2016</a:t>
             </a:fld>
             <a:endParaRPr lang="en-US"/>
           </a:p>
@@ -2093,7 +2098,7 @@
           <a:p>
             <a:fld id="{463E2EB7-25CF-43DD-B062-4895702B6E7A}" type="datetimeFigureOut">
               <a:rPr lang="en-US" smtClean="0"/>
-              <a:t>12/29/2016</a:t>
+              <a:t>12/30/2016</a:t>
             </a:fld>
             <a:endParaRPr lang="en-US"/>
           </a:p>
@@ -2346,7 +2351,7 @@
           <a:p>
             <a:fld id="{463E2EB7-25CF-43DD-B062-4895702B6E7A}" type="datetimeFigureOut">
               <a:rPr lang="en-US" smtClean="0"/>
-              <a:t>12/29/2016</a:t>
+              <a:t>12/30/2016</a:t>
             </a:fld>
             <a:endParaRPr lang="en-US"/>
           </a:p>
@@ -2559,7 +2564,7 @@
           <a:p>
             <a:fld id="{463E2EB7-25CF-43DD-B062-4895702B6E7A}" type="datetimeFigureOut">
               <a:rPr lang="en-US" smtClean="0"/>
-              <a:t>12/29/2016</a:t>
+              <a:t>12/30/2016</a:t>
             </a:fld>
             <a:endParaRPr lang="en-US"/>
           </a:p>
@@ -3020,7 +3025,7 @@
         </p:spPr>
         <p:txBody>
           <a:bodyPr>
-            <a:normAutofit/>
+            <a:normAutofit lnSpcReduction="10000"/>
           </a:bodyPr>
           <a:lstStyle/>
           <a:p>
@@ -3231,6 +3236,24 @@
               <a:rPr lang="en-US" sz="2000" dirty="0" smtClean="0"/>
               <a:t>Namespace</a:t>
             </a:r>
+          </a:p>
+          <a:p>
+            <a:pPr marL="0" indent="0">
+              <a:buNone/>
+            </a:pPr>
+            <a:r>
+              <a:rPr lang="en-US" sz="2000" dirty="0"/>
+              <a:t> </a:t>
+            </a:r>
+            <a:r>
+              <a:rPr lang="en-US" sz="2000" dirty="0" smtClean="0"/>
+              <a:t>                i</a:t>
+            </a:r>
+            <a:r>
+              <a:rPr lang="en-US" sz="2000"/>
+              <a:t>) AddTapi.NET (http://www.traysoft.com/add-tapi-telephony-library)</a:t>
+            </a:r>
+            <a:endParaRPr lang="en-US" sz="2000" dirty="0" smtClean="0"/>
           </a:p>
           <a:p>
             <a:pPr marL="0" indent="0">

</xml_diff>

<commit_message>
Added TAPI C# and JTAPI
Added TAPI C# and JTAPI
</commit_message>
<xml_diff>
--- a/Problem1-Calling phones through Web App.pptx
+++ b/Problem1-Calling phones through Web App.pptx
@@ -6,6 +6,8 @@
   </p:sldMasterIdLst>
   <p:sldIdLst>
     <p:sldId id="257" r:id="rId2"/>
+    <p:sldId id="260" r:id="rId3"/>
+    <p:sldId id="258" r:id="rId4"/>
   </p:sldIdLst>
   <p:sldSz cx="12192000" cy="6858000"/>
   <p:notesSz cx="6858000" cy="9144000"/>
@@ -243,7 +245,7 @@
           <a:p>
             <a:fld id="{463E2EB7-25CF-43DD-B062-4895702B6E7A}" type="datetimeFigureOut">
               <a:rPr lang="en-US" smtClean="0"/>
-              <a:t>12/30/2016</a:t>
+              <a:t>1/1/2017</a:t>
             </a:fld>
             <a:endParaRPr lang="en-US"/>
           </a:p>
@@ -413,7 +415,7 @@
           <a:p>
             <a:fld id="{463E2EB7-25CF-43DD-B062-4895702B6E7A}" type="datetimeFigureOut">
               <a:rPr lang="en-US" smtClean="0"/>
-              <a:t>12/30/2016</a:t>
+              <a:t>1/1/2017</a:t>
             </a:fld>
             <a:endParaRPr lang="en-US"/>
           </a:p>
@@ -593,7 +595,7 @@
           <a:p>
             <a:fld id="{463E2EB7-25CF-43DD-B062-4895702B6E7A}" type="datetimeFigureOut">
               <a:rPr lang="en-US" smtClean="0"/>
-              <a:t>12/30/2016</a:t>
+              <a:t>1/1/2017</a:t>
             </a:fld>
             <a:endParaRPr lang="en-US"/>
           </a:p>
@@ -763,7 +765,7 @@
           <a:p>
             <a:fld id="{463E2EB7-25CF-43DD-B062-4895702B6E7A}" type="datetimeFigureOut">
               <a:rPr lang="en-US" smtClean="0"/>
-              <a:t>12/30/2016</a:t>
+              <a:t>1/1/2017</a:t>
             </a:fld>
             <a:endParaRPr lang="en-US"/>
           </a:p>
@@ -1009,7 +1011,7 @@
           <a:p>
             <a:fld id="{463E2EB7-25CF-43DD-B062-4895702B6E7A}" type="datetimeFigureOut">
               <a:rPr lang="en-US" smtClean="0"/>
-              <a:t>12/30/2016</a:t>
+              <a:t>1/1/2017</a:t>
             </a:fld>
             <a:endParaRPr lang="en-US"/>
           </a:p>
@@ -1241,7 +1243,7 @@
           <a:p>
             <a:fld id="{463E2EB7-25CF-43DD-B062-4895702B6E7A}" type="datetimeFigureOut">
               <a:rPr lang="en-US" smtClean="0"/>
-              <a:t>12/30/2016</a:t>
+              <a:t>1/1/2017</a:t>
             </a:fld>
             <a:endParaRPr lang="en-US"/>
           </a:p>
@@ -1608,7 +1610,7 @@
           <a:p>
             <a:fld id="{463E2EB7-25CF-43DD-B062-4895702B6E7A}" type="datetimeFigureOut">
               <a:rPr lang="en-US" smtClean="0"/>
-              <a:t>12/30/2016</a:t>
+              <a:t>1/1/2017</a:t>
             </a:fld>
             <a:endParaRPr lang="en-US"/>
           </a:p>
@@ -1726,7 +1728,7 @@
           <a:p>
             <a:fld id="{463E2EB7-25CF-43DD-B062-4895702B6E7A}" type="datetimeFigureOut">
               <a:rPr lang="en-US" smtClean="0"/>
-              <a:t>12/30/2016</a:t>
+              <a:t>1/1/2017</a:t>
             </a:fld>
             <a:endParaRPr lang="en-US"/>
           </a:p>
@@ -1821,7 +1823,7 @@
           <a:p>
             <a:fld id="{463E2EB7-25CF-43DD-B062-4895702B6E7A}" type="datetimeFigureOut">
               <a:rPr lang="en-US" smtClean="0"/>
-              <a:t>12/30/2016</a:t>
+              <a:t>1/1/2017</a:t>
             </a:fld>
             <a:endParaRPr lang="en-US"/>
           </a:p>
@@ -2098,7 +2100,7 @@
           <a:p>
             <a:fld id="{463E2EB7-25CF-43DD-B062-4895702B6E7A}" type="datetimeFigureOut">
               <a:rPr lang="en-US" smtClean="0"/>
-              <a:t>12/30/2016</a:t>
+              <a:t>1/1/2017</a:t>
             </a:fld>
             <a:endParaRPr lang="en-US"/>
           </a:p>
@@ -2351,7 +2353,7 @@
           <a:p>
             <a:fld id="{463E2EB7-25CF-43DD-B062-4895702B6E7A}" type="datetimeFigureOut">
               <a:rPr lang="en-US" smtClean="0"/>
-              <a:t>12/30/2016</a:t>
+              <a:t>1/1/2017</a:t>
             </a:fld>
             <a:endParaRPr lang="en-US"/>
           </a:p>
@@ -2564,7 +2566,7 @@
           <a:p>
             <a:fld id="{463E2EB7-25CF-43DD-B062-4895702B6E7A}" type="datetimeFigureOut">
               <a:rPr lang="en-US" smtClean="0"/>
-              <a:t>12/30/2016</a:t>
+              <a:t>1/1/2017</a:t>
             </a:fld>
             <a:endParaRPr lang="en-US"/>
           </a:p>
@@ -3019,8 +3021,8 @@
         </p:nvSpPr>
         <p:spPr>
           <a:xfrm>
-            <a:off x="193182" y="798491"/>
-            <a:ext cx="11874321" cy="5499278"/>
+            <a:off x="193182" y="798490"/>
+            <a:ext cx="11874321" cy="6059509"/>
           </a:xfrm>
         </p:spPr>
         <p:txBody>
@@ -3250,8 +3252,31 @@
               <a:t>                i</a:t>
             </a:r>
             <a:r>
-              <a:rPr lang="en-US" sz="2000"/>
-              <a:t>) AddTapi.NET (http://www.traysoft.com/add-tapi-telephony-library)</a:t>
+              <a:rPr lang="en-US" sz="2000" dirty="0"/>
+              <a:t>) AddTapi.NET (</a:t>
+            </a:r>
+            <a:r>
+              <a:rPr lang="en-US" sz="2000" dirty="0">
+                <a:hlinkClick r:id="rId2"/>
+              </a:rPr>
+              <a:t>http://www.traysoft.com/add-tapi-telephony-library</a:t>
+            </a:r>
+            <a:r>
+              <a:rPr lang="en-US" sz="2000" dirty="0" smtClean="0"/>
+              <a:t>)</a:t>
+            </a:r>
+          </a:p>
+          <a:p>
+            <a:pPr marL="0" indent="0">
+              <a:buNone/>
+            </a:pPr>
+            <a:r>
+              <a:rPr lang="en-US" sz="2000" dirty="0"/>
+              <a:t>	</a:t>
+            </a:r>
+            <a:r>
+              <a:rPr lang="en-US" sz="2000" dirty="0" smtClean="0"/>
+              <a:t> j) JTAPI (in Java)</a:t>
             </a:r>
             <a:endParaRPr lang="en-US" sz="2000" dirty="0" smtClean="0"/>
           </a:p>
@@ -3266,6 +3291,16 @@
             <a:r>
               <a:rPr lang="en-US" sz="2000" dirty="0" smtClean="0"/>
               <a:t>                ……..to be added </a:t>
+            </a:r>
+            <a:endParaRPr lang="en-US" sz="2000" dirty="0" smtClean="0"/>
+          </a:p>
+          <a:p>
+            <a:pPr marL="0" indent="0">
+              <a:buNone/>
+            </a:pPr>
+            <a:r>
+              <a:rPr lang="en-US" sz="2000" dirty="0"/>
+              <a:t>	j) https://www.codeproject.com/Articles/10994/TAPI-Application-development-using-C-NET</a:t>
             </a:r>
             <a:endParaRPr lang="en-US" sz="2000" dirty="0"/>
           </a:p>
@@ -3275,6 +3310,291 @@
     <p:extLst>
       <p:ext uri="{BB962C8B-B14F-4D97-AF65-F5344CB8AC3E}">
         <p14:creationId xmlns:p14="http://schemas.microsoft.com/office/powerpoint/2010/main" val="4013646592"/>
+      </p:ext>
+    </p:extLst>
+  </p:cSld>
+  <p:clrMapOvr>
+    <a:masterClrMapping/>
+  </p:clrMapOvr>
+</p:sld>
+</file>
+
+<file path=ppt/slides/slide2.xml><?xml version="1.0" encoding="utf-8"?>
+<p:sld xmlns:a="http://schemas.openxmlformats.org/drawingml/2006/main" xmlns:r="http://schemas.openxmlformats.org/officeDocument/2006/relationships" xmlns:p="http://schemas.openxmlformats.org/presentationml/2006/main">
+  <p:cSld>
+    <p:spTree>
+      <p:nvGrpSpPr>
+        <p:cNvPr id="1" name=""/>
+        <p:cNvGrpSpPr/>
+        <p:nvPr/>
+      </p:nvGrpSpPr>
+      <p:grpSpPr>
+        <a:xfrm>
+          <a:off x="0" y="0"/>
+          <a:ext cx="0" cy="0"/>
+          <a:chOff x="0" y="0"/>
+          <a:chExt cx="0" cy="0"/>
+        </a:xfrm>
+      </p:grpSpPr>
+      <p:sp>
+        <p:nvSpPr>
+          <p:cNvPr id="2" name="Title 1"/>
+          <p:cNvSpPr>
+            <a:spLocks noGrp="1"/>
+          </p:cNvSpPr>
+          <p:nvPr>
+            <p:ph type="title"/>
+          </p:nvPr>
+        </p:nvSpPr>
+        <p:spPr>
+          <a:xfrm>
+            <a:off x="193183" y="141669"/>
+            <a:ext cx="11874321" cy="656822"/>
+          </a:xfrm>
+        </p:spPr>
+        <p:txBody>
+          <a:bodyPr>
+            <a:normAutofit/>
+          </a:bodyPr>
+          <a:lstStyle/>
+          <a:p>
+            <a:r>
+              <a:rPr lang="en-US" sz="2400" dirty="0" smtClean="0"/>
+              <a:t>TAPI 3.0 C#</a:t>
+            </a:r>
+            <a:endParaRPr lang="en-US" sz="2400" dirty="0"/>
+          </a:p>
+        </p:txBody>
+      </p:sp>
+      <p:sp>
+        <p:nvSpPr>
+          <p:cNvPr id="3" name="Content Placeholder 2"/>
+          <p:cNvSpPr>
+            <a:spLocks noGrp="1"/>
+          </p:cNvSpPr>
+          <p:nvPr>
+            <p:ph idx="1"/>
+          </p:nvPr>
+        </p:nvSpPr>
+        <p:spPr>
+          <a:xfrm>
+            <a:off x="193182" y="798490"/>
+            <a:ext cx="11874321" cy="6059509"/>
+          </a:xfrm>
+        </p:spPr>
+        <p:txBody>
+          <a:bodyPr>
+            <a:normAutofit/>
+          </a:bodyPr>
+          <a:lstStyle/>
+          <a:p>
+            <a:pPr marL="0" indent="0">
+              <a:buNone/>
+            </a:pPr>
+            <a:r>
+              <a:rPr lang="en-US" sz="2000" dirty="0" smtClean="0"/>
+              <a:t>Solution </a:t>
+            </a:r>
+            <a:r>
+              <a:rPr lang="en-US" sz="2000" dirty="0" smtClean="0"/>
+              <a:t>:- </a:t>
+            </a:r>
+          </a:p>
+          <a:p>
+            <a:pPr marL="0" indent="0">
+              <a:buNone/>
+            </a:pPr>
+            <a:r>
+              <a:rPr lang="en-US" sz="2000" dirty="0">
+                <a:hlinkClick r:id="rId2"/>
+              </a:rPr>
+              <a:t>https://</a:t>
+            </a:r>
+            <a:r>
+              <a:rPr lang="en-US" sz="2000" dirty="0" smtClean="0">
+                <a:hlinkClick r:id="rId2"/>
+              </a:rPr>
+              <a:t>code.msdn.microsoft.com/windowsapps/TAPI-3-in-C-Get-Lines-and-dd143eaf</a:t>
+            </a:r>
+            <a:endParaRPr lang="en-US" sz="2000" dirty="0" smtClean="0"/>
+          </a:p>
+          <a:p>
+            <a:pPr marL="0" indent="0">
+              <a:buNone/>
+            </a:pPr>
+            <a:r>
+              <a:rPr lang="en-US" sz="2000" dirty="0">
+                <a:hlinkClick r:id="rId3"/>
+              </a:rPr>
+              <a:t>http://</a:t>
+            </a:r>
+            <a:r>
+              <a:rPr lang="en-US" sz="2000" dirty="0" smtClean="0">
+                <a:hlinkClick r:id="rId3"/>
+              </a:rPr>
+              <a:t>stackoverflow.com/questions/1992073/create-an-application-using-tapi-on-windows-7-where-to-start</a:t>
+            </a:r>
+            <a:endParaRPr lang="en-US" sz="2000" dirty="0" smtClean="0"/>
+          </a:p>
+          <a:p>
+            <a:pPr marL="0" indent="0">
+              <a:buNone/>
+            </a:pPr>
+            <a:r>
+              <a:rPr lang="en-US" sz="2000" dirty="0">
+                <a:hlinkClick r:id="rId4"/>
+              </a:rPr>
+              <a:t>https://msdn.microsoft.com/en-us/library/windows/desktop/ms734273(v=vs.85).</a:t>
+            </a:r>
+            <a:r>
+              <a:rPr lang="en-US" sz="2000" dirty="0" smtClean="0">
+                <a:hlinkClick r:id="rId4"/>
+              </a:rPr>
+              <a:t>aspx</a:t>
+            </a:r>
+            <a:endParaRPr lang="en-US" sz="2000" dirty="0" smtClean="0"/>
+          </a:p>
+          <a:p>
+            <a:pPr marL="0" indent="0">
+              <a:buNone/>
+            </a:pPr>
+            <a:r>
+              <a:rPr lang="en-US" sz="2000" dirty="0">
+                <a:hlinkClick r:id="rId5"/>
+              </a:rPr>
+              <a:t>https://</a:t>
+            </a:r>
+            <a:r>
+              <a:rPr lang="en-US" sz="2000" dirty="0" smtClean="0">
+                <a:hlinkClick r:id="rId5"/>
+              </a:rPr>
+              <a:t>www.codeproject.com/Articles/10994/TAPI-Application-development-using-C-NET</a:t>
+            </a:r>
+            <a:endParaRPr lang="en-US" sz="2000" dirty="0" smtClean="0"/>
+          </a:p>
+          <a:p>
+            <a:pPr marL="0" indent="0">
+              <a:buNone/>
+            </a:pPr>
+            <a:r>
+              <a:rPr lang="en-US" sz="2000" dirty="0">
+                <a:hlinkClick r:id="rId6"/>
+              </a:rPr>
+              <a:t>http://itapi3.codeplex.com</a:t>
+            </a:r>
+            <a:r>
+              <a:rPr lang="en-US" sz="2000" dirty="0" smtClean="0">
+                <a:hlinkClick r:id="rId6"/>
+              </a:rPr>
+              <a:t>/</a:t>
+            </a:r>
+            <a:endParaRPr lang="en-US" sz="2000" dirty="0" smtClean="0"/>
+          </a:p>
+          <a:p>
+            <a:pPr marL="0" indent="0">
+              <a:buNone/>
+            </a:pPr>
+            <a:endParaRPr lang="en-US" sz="2000" dirty="0" smtClean="0"/>
+          </a:p>
+        </p:txBody>
+      </p:sp>
+    </p:spTree>
+    <p:extLst>
+      <p:ext uri="{BB962C8B-B14F-4D97-AF65-F5344CB8AC3E}">
+        <p14:creationId xmlns:p14="http://schemas.microsoft.com/office/powerpoint/2010/main" val="519151793"/>
+      </p:ext>
+    </p:extLst>
+  </p:cSld>
+  <p:clrMapOvr>
+    <a:masterClrMapping/>
+  </p:clrMapOvr>
+</p:sld>
+</file>
+
+<file path=ppt/slides/slide3.xml><?xml version="1.0" encoding="utf-8"?>
+<p:sld xmlns:a="http://schemas.openxmlformats.org/drawingml/2006/main" xmlns:r="http://schemas.openxmlformats.org/officeDocument/2006/relationships" xmlns:p="http://schemas.openxmlformats.org/presentationml/2006/main">
+  <p:cSld>
+    <p:spTree>
+      <p:nvGrpSpPr>
+        <p:cNvPr id="1" name=""/>
+        <p:cNvGrpSpPr/>
+        <p:nvPr/>
+      </p:nvGrpSpPr>
+      <p:grpSpPr>
+        <a:xfrm>
+          <a:off x="0" y="0"/>
+          <a:ext cx="0" cy="0"/>
+          <a:chOff x="0" y="0"/>
+          <a:chExt cx="0" cy="0"/>
+        </a:xfrm>
+      </p:grpSpPr>
+      <p:sp>
+        <p:nvSpPr>
+          <p:cNvPr id="2" name="Title 1"/>
+          <p:cNvSpPr>
+            <a:spLocks noGrp="1"/>
+          </p:cNvSpPr>
+          <p:nvPr>
+            <p:ph type="title"/>
+          </p:nvPr>
+        </p:nvSpPr>
+        <p:spPr/>
+        <p:txBody>
+          <a:bodyPr/>
+          <a:lstStyle/>
+          <a:p>
+            <a:r>
+              <a:rPr lang="en-US" dirty="0" smtClean="0"/>
+              <a:t>Skype</a:t>
+            </a:r>
+            <a:endParaRPr lang="en-US" dirty="0"/>
+          </a:p>
+        </p:txBody>
+      </p:sp>
+      <p:sp>
+        <p:nvSpPr>
+          <p:cNvPr id="3" name="Content Placeholder 2"/>
+          <p:cNvSpPr>
+            <a:spLocks noGrp="1"/>
+          </p:cNvSpPr>
+          <p:nvPr>
+            <p:ph idx="1"/>
+          </p:nvPr>
+        </p:nvSpPr>
+        <p:spPr>
+          <a:xfrm>
+            <a:off x="838200" y="1519518"/>
+            <a:ext cx="10515600" cy="4657445"/>
+          </a:xfrm>
+        </p:spPr>
+        <p:txBody>
+          <a:bodyPr/>
+          <a:lstStyle/>
+          <a:p>
+            <a:pPr marL="0" indent="0">
+              <a:buNone/>
+            </a:pPr>
+            <a:r>
+              <a:rPr lang="en-US" dirty="0"/>
+              <a:t>Skype to Skype calls can be made free of charge, but calling a mobile or landline will require the purchase of Skype credit. Choose the “Skype Credit” option or go to </a:t>
+            </a:r>
+            <a:r>
+              <a:rPr lang="en-US" dirty="0">
+                <a:hlinkClick r:id="rId2"/>
+              </a:rPr>
+              <a:t>https://secure.skype.com/en/credit</a:t>
+            </a:r>
+            <a:r>
+              <a:rPr lang="en-US" dirty="0"/>
+              <a:t> on your platform of choice to see credit purchasing options. Once purchased, use the “Call Phone” option to enter a mobile or landline phone number, and hit the Phone icon to initiate the call. These calls will consume Skype credit at varying rates depending on the country you are calling.</a:t>
+            </a:r>
+          </a:p>
+        </p:txBody>
+      </p:sp>
+    </p:spTree>
+    <p:extLst>
+      <p:ext uri="{BB962C8B-B14F-4D97-AF65-F5344CB8AC3E}">
+        <p14:creationId xmlns:p14="http://schemas.microsoft.com/office/powerpoint/2010/main" val="56927899"/>
       </p:ext>
     </p:extLst>
   </p:cSld>

</xml_diff>